<commit_message>
Edit P1C3 do while loop concept.
</commit_message>
<xml_diff>
--- a/resources/ppt-slides/control-flow-do-while-loop.pptx
+++ b/resources/ppt-slides/control-flow-do-while-loop.pptx
@@ -251,7 +251,7 @@
           <a:p>
             <a:fld id="{964302DC-9F53-934F-AE4D-0F1F197008C1}" type="datetimeFigureOut">
               <a:rPr lang="en-US" smtClean="0"/>
-              <a:t>10/19/23</a:t>
+              <a:t>2/9/24</a:t>
             </a:fld>
             <a:endParaRPr lang="en-US"/>
           </a:p>
@@ -421,7 +421,7 @@
           <a:p>
             <a:fld id="{964302DC-9F53-934F-AE4D-0F1F197008C1}" type="datetimeFigureOut">
               <a:rPr lang="en-US" smtClean="0"/>
-              <a:t>10/19/23</a:t>
+              <a:t>2/9/24</a:t>
             </a:fld>
             <a:endParaRPr lang="en-US"/>
           </a:p>
@@ -601,7 +601,7 @@
           <a:p>
             <a:fld id="{964302DC-9F53-934F-AE4D-0F1F197008C1}" type="datetimeFigureOut">
               <a:rPr lang="en-US" smtClean="0"/>
-              <a:t>10/19/23</a:t>
+              <a:t>2/9/24</a:t>
             </a:fld>
             <a:endParaRPr lang="en-US"/>
           </a:p>
@@ -771,7 +771,7 @@
           <a:p>
             <a:fld id="{964302DC-9F53-934F-AE4D-0F1F197008C1}" type="datetimeFigureOut">
               <a:rPr lang="en-US" smtClean="0"/>
-              <a:t>10/19/23</a:t>
+              <a:t>2/9/24</a:t>
             </a:fld>
             <a:endParaRPr lang="en-US"/>
           </a:p>
@@ -1015,7 +1015,7 @@
           <a:p>
             <a:fld id="{964302DC-9F53-934F-AE4D-0F1F197008C1}" type="datetimeFigureOut">
               <a:rPr lang="en-US" smtClean="0"/>
-              <a:t>10/19/23</a:t>
+              <a:t>2/9/24</a:t>
             </a:fld>
             <a:endParaRPr lang="en-US"/>
           </a:p>
@@ -1247,7 +1247,7 @@
           <a:p>
             <a:fld id="{964302DC-9F53-934F-AE4D-0F1F197008C1}" type="datetimeFigureOut">
               <a:rPr lang="en-US" smtClean="0"/>
-              <a:t>10/19/23</a:t>
+              <a:t>2/9/24</a:t>
             </a:fld>
             <a:endParaRPr lang="en-US"/>
           </a:p>
@@ -1614,7 +1614,7 @@
           <a:p>
             <a:fld id="{964302DC-9F53-934F-AE4D-0F1F197008C1}" type="datetimeFigureOut">
               <a:rPr lang="en-US" smtClean="0"/>
-              <a:t>10/19/23</a:t>
+              <a:t>2/9/24</a:t>
             </a:fld>
             <a:endParaRPr lang="en-US"/>
           </a:p>
@@ -1732,7 +1732,7 @@
           <a:p>
             <a:fld id="{964302DC-9F53-934F-AE4D-0F1F197008C1}" type="datetimeFigureOut">
               <a:rPr lang="en-US" smtClean="0"/>
-              <a:t>10/19/23</a:t>
+              <a:t>2/9/24</a:t>
             </a:fld>
             <a:endParaRPr lang="en-US"/>
           </a:p>
@@ -1827,7 +1827,7 @@
           <a:p>
             <a:fld id="{964302DC-9F53-934F-AE4D-0F1F197008C1}" type="datetimeFigureOut">
               <a:rPr lang="en-US" smtClean="0"/>
-              <a:t>10/19/23</a:t>
+              <a:t>2/9/24</a:t>
             </a:fld>
             <a:endParaRPr lang="en-US"/>
           </a:p>
@@ -2104,7 +2104,7 @@
           <a:p>
             <a:fld id="{964302DC-9F53-934F-AE4D-0F1F197008C1}" type="datetimeFigureOut">
               <a:rPr lang="en-US" smtClean="0"/>
-              <a:t>10/19/23</a:t>
+              <a:t>2/9/24</a:t>
             </a:fld>
             <a:endParaRPr lang="en-US"/>
           </a:p>
@@ -2361,7 +2361,7 @@
           <a:p>
             <a:fld id="{964302DC-9F53-934F-AE4D-0F1F197008C1}" type="datetimeFigureOut">
               <a:rPr lang="en-US" smtClean="0"/>
-              <a:t>10/19/23</a:t>
+              <a:t>2/9/24</a:t>
             </a:fld>
             <a:endParaRPr lang="en-US"/>
           </a:p>
@@ -2426,9 +2426,18 @@
 <p:sldMaster xmlns:a="http://schemas.openxmlformats.org/drawingml/2006/main" xmlns:r="http://schemas.openxmlformats.org/officeDocument/2006/relationships" xmlns:p="http://schemas.openxmlformats.org/presentationml/2006/main">
   <p:cSld>
     <p:bg>
-      <p:bgRef idx="1001">
-        <a:schemeClr val="bg1"/>
-      </p:bgRef>
+      <p:bgPr>
+        <a:blipFill dpi="0" rotWithShape="1">
+          <a:blip r:embed="rId13">
+            <a:lum/>
+          </a:blip>
+          <a:srcRect/>
+          <a:stretch>
+            <a:fillRect/>
+          </a:stretch>
+        </a:blipFill>
+        <a:effectLst/>
+      </p:bgPr>
     </p:bg>
     <p:spTree>
       <p:nvGrpSpPr>
@@ -2574,7 +2583,7 @@
           <a:p>
             <a:fld id="{964302DC-9F53-934F-AE4D-0F1F197008C1}" type="datetimeFigureOut">
               <a:rPr lang="en-US" smtClean="0"/>
-              <a:t>10/19/23</a:t>
+              <a:t>2/9/24</a:t>
             </a:fld>
             <a:endParaRPr lang="en-US"/>
           </a:p>
@@ -2965,20 +2974,6 @@
 <file path=ppt/slides/slide1.xml><?xml version="1.0" encoding="utf-8"?>
 <p:sld xmlns:a="http://schemas.openxmlformats.org/drawingml/2006/main" xmlns:r="http://schemas.openxmlformats.org/officeDocument/2006/relationships" xmlns:p="http://schemas.openxmlformats.org/presentationml/2006/main">
   <p:cSld>
-    <p:bg>
-      <p:bgPr>
-        <a:blipFill dpi="0" rotWithShape="1">
-          <a:blip r:embed="rId2">
-            <a:lum/>
-          </a:blip>
-          <a:srcRect/>
-          <a:stretch>
-            <a:fillRect/>
-          </a:stretch>
-        </a:blipFill>
-        <a:effectLst/>
-      </p:bgPr>
-    </p:bg>
     <p:spTree>
       <p:nvGrpSpPr>
         <p:cNvPr id="1" name=""/>
@@ -3099,7 +3094,7 @@
                     </a:schemeClr>
                   </a:solidFill>
                 </a:rPr>
-                <a:t>    WriteLine("Hello");</a:t>
+                <a:t>      WriteLine("Hello");</a:t>
               </a:r>
             </a:p>
             <a:p>
@@ -3115,7 +3110,7 @@
                     </a:schemeClr>
                   </a:solidFill>
                 </a:rPr>
-                <a:t>    Write("Again: ");</a:t>
+                <a:t>      Write("Again: ");</a:t>
               </a:r>
             </a:p>
             <a:p>
@@ -3131,7 +3126,7 @@
                     </a:schemeClr>
                   </a:solidFill>
                 </a:rPr>
-                <a:t>     again = </a:t>
+                <a:t>      again = </a:t>
               </a:r>
               <a:r>
                 <a:rPr lang="en-AU" sz="1600" dirty="0" err="1">
@@ -3167,7 +3162,7 @@
                     </a:schemeClr>
                   </a:solidFill>
                 </a:rPr>
-                <a:t>} (again == "y” || again == ”Y”);</a:t>
+                <a:t>} while (again == "y" || again == "Y");</a:t>
               </a:r>
               <a:br>
                 <a:rPr lang="en-AU" sz="1600" dirty="0">
@@ -3239,7 +3234,7 @@
               <p:nvPr/>
             </p:nvPicPr>
             <p:blipFill>
-              <a:blip r:embed="rId3">
+              <a:blip r:embed="rId2">
                 <a:alphaModFix amt="30000"/>
               </a:blip>
               <a:stretch>
@@ -5329,7 +5324,7 @@
             <p:nvPr/>
           </p:nvPicPr>
           <p:blipFill>
-            <a:blip r:embed="rId4">
+            <a:blip r:embed="rId3">
               <a:alphaModFix amt="30000"/>
             </a:blip>
             <a:stretch>
@@ -5567,20 +5562,6 @@
 <file path=ppt/slides/slide2.xml><?xml version="1.0" encoding="utf-8"?>
 <p:sld xmlns:a="http://schemas.openxmlformats.org/drawingml/2006/main" xmlns:r="http://schemas.openxmlformats.org/officeDocument/2006/relationships" xmlns:p="http://schemas.openxmlformats.org/presentationml/2006/main">
   <p:cSld>
-    <p:bg>
-      <p:bgPr>
-        <a:blipFill dpi="0" rotWithShape="1">
-          <a:blip r:embed="rId2">
-            <a:lum/>
-          </a:blip>
-          <a:srcRect/>
-          <a:stretch>
-            <a:fillRect/>
-          </a:stretch>
-        </a:blipFill>
-        <a:effectLst/>
-      </p:bgPr>
-    </p:bg>
     <p:spTree>
       <p:nvGrpSpPr>
         <p:cNvPr id="1" name=""/>
@@ -5713,7 +5694,7 @@
                     </a:schemeClr>
                   </a:solidFill>
                 </a:rPr>
-                <a:t>    WriteLine("Hello");</a:t>
+                <a:t>      WriteLine("Hello");</a:t>
               </a:r>
             </a:p>
             <a:p>
@@ -5729,7 +5710,7 @@
                     </a:schemeClr>
                   </a:solidFill>
                 </a:rPr>
-                <a:t>    Write("Again: ");</a:t>
+                <a:t>      Write("Again: ");</a:t>
               </a:r>
             </a:p>
             <a:p>
@@ -5745,7 +5726,7 @@
                     </a:schemeClr>
                   </a:solidFill>
                 </a:rPr>
-                <a:t>     again = </a:t>
+                <a:t>      again = </a:t>
               </a:r>
               <a:r>
                 <a:rPr lang="en-AU" sz="1600" dirty="0" err="1">
@@ -5781,7 +5762,7 @@
                     </a:schemeClr>
                   </a:solidFill>
                 </a:rPr>
-                <a:t>} (again == "y” || again == ”Y”);</a:t>
+                <a:t>} while (again == "y" || again == "Y");</a:t>
               </a:r>
               <a:br>
                 <a:rPr lang="en-AU" sz="1600" dirty="0">
@@ -5853,7 +5834,7 @@
               <p:nvPr/>
             </p:nvPicPr>
             <p:blipFill>
-              <a:blip r:embed="rId3">
+              <a:blip r:embed="rId2">
                 <a:alphaModFix amt="30000"/>
               </a:blip>
               <a:stretch>
@@ -7951,7 +7932,7 @@
             <p:nvPr/>
           </p:nvPicPr>
           <p:blipFill>
-            <a:blip r:embed="rId4">
+            <a:blip r:embed="rId3">
               <a:alphaModFix amt="30000"/>
             </a:blip>
             <a:stretch>
@@ -8141,20 +8122,6 @@
 <file path=ppt/slides/slide3.xml><?xml version="1.0" encoding="utf-8"?>
 <p:sld xmlns:a="http://schemas.openxmlformats.org/drawingml/2006/main" xmlns:r="http://schemas.openxmlformats.org/officeDocument/2006/relationships" xmlns:p="http://schemas.openxmlformats.org/presentationml/2006/main">
   <p:cSld>
-    <p:bg>
-      <p:bgPr>
-        <a:blipFill dpi="0" rotWithShape="1">
-          <a:blip r:embed="rId2">
-            <a:lum/>
-          </a:blip>
-          <a:srcRect/>
-          <a:stretch>
-            <a:fillRect/>
-          </a:stretch>
-        </a:blipFill>
-        <a:effectLst/>
-      </p:bgPr>
-    </p:bg>
     <p:spTree>
       <p:nvGrpSpPr>
         <p:cNvPr id="1" name=""/>
@@ -8322,7 +8289,7 @@
               </a:pPr>
               <a:r>
                 <a:rPr lang="en-AU" sz="1600" dirty="0"/>
-                <a:t>    WriteLine("Hello");</a:t>
+                <a:t>      WriteLine("Hello");</a:t>
               </a:r>
             </a:p>
             <a:p>
@@ -8332,7 +8299,7 @@
               </a:pPr>
               <a:r>
                 <a:rPr lang="en-AU" sz="1600" dirty="0"/>
-                <a:t>    Write("Again: ");</a:t>
+                <a:t>      Write("Again: ");</a:t>
               </a:r>
             </a:p>
             <a:p>
@@ -8342,7 +8309,7 @@
               </a:pPr>
               <a:r>
                 <a:rPr lang="en-AU" sz="1600" dirty="0"/>
-                <a:t>     again = </a:t>
+                <a:t>      again = </a:t>
               </a:r>
               <a:r>
                 <a:rPr lang="en-AU" sz="1600" dirty="0" err="1"/>
@@ -8366,7 +8333,7 @@
                     </a:schemeClr>
                   </a:solidFill>
                 </a:rPr>
-                <a:t>} (again == "y” || again == ”Y”);</a:t>
+                <a:t>} while (again == "y" || again == "Y");</a:t>
               </a:r>
               <a:br>
                 <a:rPr lang="en-AU" sz="1600" dirty="0">
@@ -8438,7 +8405,7 @@
               <p:nvPr/>
             </p:nvPicPr>
             <p:blipFill>
-              <a:blip r:embed="rId3">
+              <a:blip r:embed="rId2">
                 <a:alphaModFix amt="30000"/>
               </a:blip>
               <a:stretch>
@@ -10517,7 +10484,7 @@
             <p:nvPr/>
           </p:nvPicPr>
           <p:blipFill>
-            <a:blip r:embed="rId4">
+            <a:blip r:embed="rId3">
               <a:alphaModFix/>
             </a:blip>
             <a:stretch>
@@ -10793,20 +10760,6 @@
 <file path=ppt/slides/slide4.xml><?xml version="1.0" encoding="utf-8"?>
 <p:sld xmlns:a="http://schemas.openxmlformats.org/drawingml/2006/main" xmlns:r="http://schemas.openxmlformats.org/officeDocument/2006/relationships" xmlns:p="http://schemas.openxmlformats.org/presentationml/2006/main">
   <p:cSld>
-    <p:bg>
-      <p:bgPr>
-        <a:blipFill dpi="0" rotWithShape="1">
-          <a:blip r:embed="rId2">
-            <a:lum/>
-          </a:blip>
-          <a:srcRect/>
-          <a:stretch>
-            <a:fillRect/>
-          </a:stretch>
-        </a:blipFill>
-        <a:effectLst/>
-      </p:bgPr>
-    </p:bg>
     <p:spTree>
       <p:nvGrpSpPr>
         <p:cNvPr id="1" name=""/>
@@ -10998,7 +10951,7 @@
                     </a:schemeClr>
                   </a:solidFill>
                 </a:rPr>
-                <a:t>    WriteLine("Hello");</a:t>
+                <a:t>      WriteLine("Hello");</a:t>
               </a:r>
             </a:p>
             <a:p>
@@ -11014,7 +10967,7 @@
                     </a:schemeClr>
                   </a:solidFill>
                 </a:rPr>
-                <a:t>    Write("Again: ");</a:t>
+                <a:t>      Write("Again: ");</a:t>
               </a:r>
             </a:p>
             <a:p>
@@ -11030,7 +10983,7 @@
                     </a:schemeClr>
                   </a:solidFill>
                 </a:rPr>
-                <a:t>     again = </a:t>
+                <a:t>      again = </a:t>
               </a:r>
               <a:r>
                 <a:rPr lang="en-AU" sz="1600" dirty="0" err="1">
@@ -11060,7 +11013,7 @@
               </a:pPr>
               <a:r>
                 <a:rPr lang="en-AU" sz="1600" dirty="0"/>
-                <a:t>} (again == "y” || again == ”Y”);</a:t>
+                <a:t>} while (again == "y" || again == "Y");</a:t>
               </a:r>
               <a:br>
                 <a:rPr lang="en-AU" sz="1600" dirty="0">
@@ -11132,7 +11085,7 @@
               <p:nvPr/>
             </p:nvPicPr>
             <p:blipFill>
-              <a:blip r:embed="rId3">
+              <a:blip r:embed="rId2">
                 <a:alphaModFix amt="30000"/>
               </a:blip>
               <a:stretch>
@@ -13222,7 +13175,7 @@
             <p:nvPr/>
           </p:nvPicPr>
           <p:blipFill>
-            <a:blip r:embed="rId4">
+            <a:blip r:embed="rId3">
               <a:alphaModFix amt="30000"/>
             </a:blip>
             <a:stretch>
@@ -13496,20 +13449,6 @@
 <file path=ppt/slides/slide5.xml><?xml version="1.0" encoding="utf-8"?>
 <p:sld xmlns:a="http://schemas.openxmlformats.org/drawingml/2006/main" xmlns:r="http://schemas.openxmlformats.org/officeDocument/2006/relationships" xmlns:p="http://schemas.openxmlformats.org/presentationml/2006/main">
   <p:cSld>
-    <p:bg>
-      <p:bgPr>
-        <a:blipFill dpi="0" rotWithShape="1">
-          <a:blip r:embed="rId2">
-            <a:lum/>
-          </a:blip>
-          <a:srcRect/>
-          <a:stretch>
-            <a:fillRect/>
-          </a:stretch>
-        </a:blipFill>
-        <a:effectLst/>
-      </p:bgPr>
-    </p:bg>
     <p:spTree>
       <p:nvGrpSpPr>
         <p:cNvPr id="1" name=""/>
@@ -13701,7 +13640,7 @@
               </a:pPr>
               <a:r>
                 <a:rPr lang="en-AU" sz="1600" dirty="0"/>
-                <a:t>    WriteLine("Hello");</a:t>
+                <a:t>      WriteLine("Hello");</a:t>
               </a:r>
             </a:p>
             <a:p>
@@ -13711,7 +13650,7 @@
               </a:pPr>
               <a:r>
                 <a:rPr lang="en-AU" sz="1600" dirty="0"/>
-                <a:t>    Write("Again: ");</a:t>
+                <a:t>      Write("Again: ");</a:t>
               </a:r>
             </a:p>
             <a:p>
@@ -13721,7 +13660,7 @@
               </a:pPr>
               <a:r>
                 <a:rPr lang="en-AU" sz="1600" dirty="0"/>
-                <a:t>     again = </a:t>
+                <a:t>      again = </a:t>
               </a:r>
               <a:r>
                 <a:rPr lang="en-AU" sz="1600" dirty="0" err="1"/>
@@ -13745,7 +13684,7 @@
                     </a:schemeClr>
                   </a:solidFill>
                 </a:rPr>
-                <a:t>} (again == "y” || again == ”Y”);</a:t>
+                <a:t>} while (again == "y" || again == "Y");</a:t>
               </a:r>
               <a:br>
                 <a:rPr lang="en-AU" sz="1600" dirty="0">
@@ -13817,7 +13756,7 @@
               <p:nvPr/>
             </p:nvPicPr>
             <p:blipFill>
-              <a:blip r:embed="rId3">
+              <a:blip r:embed="rId2">
                 <a:alphaModFix amt="30000"/>
               </a:blip>
               <a:stretch>
@@ -15853,7 +15792,7 @@
             <p:nvPr/>
           </p:nvPicPr>
           <p:blipFill>
-            <a:blip r:embed="rId4">
+            <a:blip r:embed="rId3">
               <a:alphaModFix/>
             </a:blip>
             <a:stretch>
@@ -16129,20 +16068,6 @@
 <file path=ppt/slides/slide6.xml><?xml version="1.0" encoding="utf-8"?>
 <p:sld xmlns:a="http://schemas.openxmlformats.org/drawingml/2006/main" xmlns:r="http://schemas.openxmlformats.org/officeDocument/2006/relationships" xmlns:p="http://schemas.openxmlformats.org/presentationml/2006/main">
   <p:cSld>
-    <p:bg>
-      <p:bgPr>
-        <a:blipFill dpi="0" rotWithShape="1">
-          <a:blip r:embed="rId2">
-            <a:lum/>
-          </a:blip>
-          <a:srcRect/>
-          <a:stretch>
-            <a:fillRect/>
-          </a:stretch>
-        </a:blipFill>
-        <a:effectLst/>
-      </p:bgPr>
-    </p:bg>
     <p:spTree>
       <p:nvGrpSpPr>
         <p:cNvPr id="1" name=""/>
@@ -16281,7 +16206,7 @@
                     </a:schemeClr>
                   </a:solidFill>
                 </a:rPr>
-                <a:t>    WriteLine("Hello");</a:t>
+                <a:t>      WriteLine("Hello");</a:t>
               </a:r>
             </a:p>
             <a:p>
@@ -16297,7 +16222,7 @@
                     </a:schemeClr>
                   </a:solidFill>
                 </a:rPr>
-                <a:t>    Write("Again: ");</a:t>
+                <a:t>      Write("Again: ");</a:t>
               </a:r>
             </a:p>
             <a:p>
@@ -16313,7 +16238,7 @@
                     </a:schemeClr>
                   </a:solidFill>
                 </a:rPr>
-                <a:t>     again = </a:t>
+                <a:t>      again = </a:t>
               </a:r>
               <a:r>
                 <a:rPr lang="en-AU" sz="1600" dirty="0" err="1">
@@ -16343,7 +16268,7 @@
               </a:pPr>
               <a:r>
                 <a:rPr lang="en-AU" sz="1600" dirty="0"/>
-                <a:t>} (again == "y” || again == ”Y”);</a:t>
+                <a:t>} while (again == "y" || again == "Y");</a:t>
               </a:r>
               <a:br>
                 <a:rPr lang="en-AU" sz="1600" dirty="0">
@@ -16415,7 +16340,7 @@
               <p:nvPr/>
             </p:nvPicPr>
             <p:blipFill>
-              <a:blip r:embed="rId3">
+              <a:blip r:embed="rId2">
                 <a:alphaModFix amt="30000"/>
               </a:blip>
               <a:stretch>
@@ -18460,7 +18385,7 @@
             <p:nvPr/>
           </p:nvPicPr>
           <p:blipFill>
-            <a:blip r:embed="rId4">
+            <a:blip r:embed="rId3">
               <a:alphaModFix amt="30000"/>
             </a:blip>
             <a:stretch>
@@ -18811,20 +18736,6 @@
 <file path=ppt/slides/slide7.xml><?xml version="1.0" encoding="utf-8"?>
 <p:sld xmlns:a="http://schemas.openxmlformats.org/drawingml/2006/main" xmlns:r="http://schemas.openxmlformats.org/officeDocument/2006/relationships" xmlns:p="http://schemas.openxmlformats.org/presentationml/2006/main">
   <p:cSld>
-    <p:bg>
-      <p:bgPr>
-        <a:blipFill dpi="0" rotWithShape="1">
-          <a:blip r:embed="rId2">
-            <a:lum/>
-          </a:blip>
-          <a:srcRect/>
-          <a:stretch>
-            <a:fillRect/>
-          </a:stretch>
-        </a:blipFill>
-        <a:effectLst/>
-      </p:bgPr>
-    </p:bg>
     <p:spTree>
       <p:nvGrpSpPr>
         <p:cNvPr id="1" name=""/>
@@ -18951,7 +18862,7 @@
               </a:pPr>
               <a:r>
                 <a:rPr lang="en-AU" sz="1600" dirty="0"/>
-                <a:t>    WriteLine("Hello");</a:t>
+                <a:t>      WriteLine("Hello");</a:t>
               </a:r>
             </a:p>
             <a:p>
@@ -18961,7 +18872,7 @@
               </a:pPr>
               <a:r>
                 <a:rPr lang="en-AU" sz="1600" dirty="0"/>
-                <a:t>    Write("Again: ");</a:t>
+                <a:t>      Write("Again: ");</a:t>
               </a:r>
             </a:p>
             <a:p>
@@ -18971,7 +18882,7 @@
               </a:pPr>
               <a:r>
                 <a:rPr lang="en-AU" sz="1600" dirty="0"/>
-                <a:t>     again = </a:t>
+                <a:t>      again = </a:t>
               </a:r>
               <a:r>
                 <a:rPr lang="en-AU" sz="1600" dirty="0" err="1"/>
@@ -18995,7 +18906,7 @@
                     </a:schemeClr>
                   </a:solidFill>
                 </a:rPr>
-                <a:t>} (again == "y” || again == ”Y”);</a:t>
+                <a:t>} while (again == "y" || again == "Y");</a:t>
               </a:r>
               <a:br>
                 <a:rPr lang="en-AU" sz="1600" dirty="0">
@@ -19067,7 +18978,7 @@
               <p:nvPr/>
             </p:nvPicPr>
             <p:blipFill>
-              <a:blip r:embed="rId3">
+              <a:blip r:embed="rId2">
                 <a:alphaModFix amt="30000"/>
               </a:blip>
               <a:stretch>
@@ -21103,7 +21014,7 @@
             <p:nvPr/>
           </p:nvPicPr>
           <p:blipFill>
-            <a:blip r:embed="rId4">
+            <a:blip r:embed="rId3">
               <a:alphaModFix/>
             </a:blip>
             <a:stretch>
@@ -21468,20 +21379,6 @@
 <file path=ppt/slides/slide8.xml><?xml version="1.0" encoding="utf-8"?>
 <p:sld xmlns:a="http://schemas.openxmlformats.org/drawingml/2006/main" xmlns:r="http://schemas.openxmlformats.org/officeDocument/2006/relationships" xmlns:p="http://schemas.openxmlformats.org/presentationml/2006/main">
   <p:cSld>
-    <p:bg>
-      <p:bgPr>
-        <a:blipFill dpi="0" rotWithShape="1">
-          <a:blip r:embed="rId2">
-            <a:lum/>
-          </a:blip>
-          <a:srcRect/>
-          <a:stretch>
-            <a:fillRect/>
-          </a:stretch>
-        </a:blipFill>
-        <a:effectLst/>
-      </p:bgPr>
-    </p:bg>
     <p:spTree>
       <p:nvGrpSpPr>
         <p:cNvPr id="1" name=""/>
@@ -21620,7 +21517,7 @@
                     </a:schemeClr>
                   </a:solidFill>
                 </a:rPr>
-                <a:t>    WriteLine("Hello");</a:t>
+                <a:t>      WriteLine("Hello");</a:t>
               </a:r>
             </a:p>
             <a:p>
@@ -21636,7 +21533,7 @@
                     </a:schemeClr>
                   </a:solidFill>
                 </a:rPr>
-                <a:t>    Write("Again: ");</a:t>
+                <a:t>      Write("Again: ");</a:t>
               </a:r>
             </a:p>
             <a:p>
@@ -21652,7 +21549,7 @@
                     </a:schemeClr>
                   </a:solidFill>
                 </a:rPr>
-                <a:t>     again = </a:t>
+                <a:t>      again = </a:t>
               </a:r>
               <a:r>
                 <a:rPr lang="en-AU" sz="1600" dirty="0" err="1">
@@ -21682,7 +21579,7 @@
               </a:pPr>
               <a:r>
                 <a:rPr lang="en-AU" sz="1600" dirty="0"/>
-                <a:t>} (again == "y” || again == ”Y”);</a:t>
+                <a:t>} while (again == "y" || again == "Y");</a:t>
               </a:r>
               <a:br>
                 <a:rPr lang="en-AU" sz="1600" dirty="0">
@@ -21754,7 +21651,7 @@
               <p:nvPr/>
             </p:nvPicPr>
             <p:blipFill>
-              <a:blip r:embed="rId3">
+              <a:blip r:embed="rId2">
                 <a:alphaModFix amt="30000"/>
               </a:blip>
               <a:stretch>
@@ -23799,7 +23696,7 @@
             <p:nvPr/>
           </p:nvPicPr>
           <p:blipFill>
-            <a:blip r:embed="rId4">
+            <a:blip r:embed="rId3">
               <a:alphaModFix amt="30000"/>
             </a:blip>
             <a:stretch>
@@ -24174,20 +24071,6 @@
 <file path=ppt/slides/slide9.xml><?xml version="1.0" encoding="utf-8"?>
 <p:sld xmlns:a="http://schemas.openxmlformats.org/drawingml/2006/main" xmlns:r="http://schemas.openxmlformats.org/officeDocument/2006/relationships" xmlns:p="http://schemas.openxmlformats.org/presentationml/2006/main">
   <p:cSld>
-    <p:bg>
-      <p:bgPr>
-        <a:blipFill dpi="0" rotWithShape="1">
-          <a:blip r:embed="rId2">
-            <a:lum/>
-          </a:blip>
-          <a:srcRect/>
-          <a:stretch>
-            <a:fillRect/>
-          </a:stretch>
-        </a:blipFill>
-        <a:effectLst/>
-      </p:bgPr>
-    </p:bg>
     <p:spTree>
       <p:nvGrpSpPr>
         <p:cNvPr id="1" name=""/>
@@ -24326,7 +24209,7 @@
                     </a:schemeClr>
                   </a:solidFill>
                 </a:rPr>
-                <a:t>    WriteLine("Hello");</a:t>
+                <a:t>      WriteLine("Hello");</a:t>
               </a:r>
             </a:p>
             <a:p>
@@ -24342,7 +24225,7 @@
                     </a:schemeClr>
                   </a:solidFill>
                 </a:rPr>
-                <a:t>    Write("Again: ");</a:t>
+                <a:t>      Write("Again: ");</a:t>
               </a:r>
             </a:p>
             <a:p>
@@ -24358,7 +24241,7 @@
                     </a:schemeClr>
                   </a:solidFill>
                 </a:rPr>
-                <a:t>     again = </a:t>
+                <a:t>       again = </a:t>
               </a:r>
               <a:r>
                 <a:rPr lang="en-AU" sz="1600" dirty="0" err="1">
@@ -24394,7 +24277,7 @@
                     </a:schemeClr>
                   </a:solidFill>
                 </a:rPr>
-                <a:t>} (again == "y” || again == ”Y”);</a:t>
+                <a:t>} while (again == "y" || again == "Y");</a:t>
               </a:r>
               <a:br>
                 <a:rPr lang="en-AU" sz="1600" dirty="0">
@@ -24460,7 +24343,7 @@
               <p:nvPr/>
             </p:nvPicPr>
             <p:blipFill>
-              <a:blip r:embed="rId3">
+              <a:blip r:embed="rId2">
                 <a:alphaModFix amt="30000"/>
               </a:blip>
               <a:stretch>
@@ -26504,7 +26387,7 @@
             <p:nvPr/>
           </p:nvPicPr>
           <p:blipFill>
-            <a:blip r:embed="rId4">
+            <a:blip r:embed="rId3">
               <a:alphaModFix/>
             </a:blip>
             <a:stretch>

</xml_diff>